<commit_message>
Reston Day 3 Adds
</commit_message>
<xml_diff>
--- a/Labs/70-533-00-Labs.pptx
+++ b/Labs/70-533-00-Labs.pptx
@@ -389,7 +389,7 @@
           <a:p>
             <a:fld id="{7D784404-57E5-4341-9230-5EC072B8C3C5}" type="datetimeFigureOut">
               <a:rPr lang="en-US" smtClean="0"/>
-              <a:t>6/5/2018</a:t>
+              <a:t>6/13/2018</a:t>
             </a:fld>
             <a:endParaRPr lang="en-US"/>
           </a:p>
@@ -566,7 +566,7 @@
           <a:p>
             <a:fld id="{9933EFA3-31EF-403B-8080-9776000D59FF}" type="datetimeFigureOut">
               <a:rPr lang="en-US" smtClean="0"/>
-              <a:t>6/5/2018</a:t>
+              <a:t>6/13/2018</a:t>
             </a:fld>
             <a:endParaRPr lang="en-US" dirty="0"/>
           </a:p>
@@ -3819,7 +3819,7 @@
           <a:p>
             <a:fld id="{EA2B2ED8-C573-45EF-BF68-CEC19505703A}" type="datetime8">
               <a:rPr lang="en-US" smtClean="0"/>
-              <a:t>6/5/2018 10:54 AM</a:t>
+              <a:t>6/13/2018 9:07 AM</a:t>
             </a:fld>
             <a:endParaRPr lang="en-US" dirty="0"/>
           </a:p>
@@ -4054,7 +4054,7 @@
           <a:p>
             <a:fld id="{90EC29EE-A8AD-4CE0-9C0B-116E0D4D7533}" type="datetime8">
               <a:rPr lang="en-US" smtClean="0"/>
-              <a:t>6/5/2018 10:54 AM</a:t>
+              <a:t>6/13/2018 9:07 AM</a:t>
             </a:fld>
             <a:endParaRPr lang="en-US" dirty="0"/>
           </a:p>
@@ -28275,13 +28275,13 @@
                 <a:latin typeface="+mn-lt"/>
                 <a:hlinkClick r:id="rId3"/>
               </a:rPr>
-              <a:t>http://github.com/guruskill/70-535</a:t>
+              <a:t>http://github.com/guruskill/70-533</a:t>
             </a:r>
             <a:r>
               <a:rPr lang="en-US" b="0" kern="0" dirty="0">
                 <a:latin typeface="+mn-lt"/>
               </a:rPr>
-              <a:t>  Labs/70-535-00-Labs.pptx or .pdf</a:t>
+              <a:t>   Labs/70-535-00-Labs.pptx or .pdf</a:t>
             </a:r>
           </a:p>
         </p:txBody>
@@ -28732,6 +28732,30 @@
                 <a:latin typeface="+mn-lt"/>
               </a:rPr>
               <a:t>What challenges do you think you need to prepare for?</a:t>
+            </a:r>
+          </a:p>
+          <a:p>
+            <a:pPr lvl="0">
+              <a:buFont typeface="+mj-lt"/>
+              <a:buAutoNum type="arabicPeriod"/>
+            </a:pPr>
+            <a:r>
+              <a:rPr lang="en-US" sz="2800" dirty="0">
+                <a:latin typeface="+mn-lt"/>
+              </a:rPr>
+              <a:t>Bonus Question: </a:t>
+            </a:r>
+            <a:r>
+              <a:rPr lang="en-US" sz="2800">
+                <a:latin typeface="+mn-lt"/>
+              </a:rPr>
+              <a:t>How could </a:t>
+            </a:r>
+            <a:r>
+              <a:rPr lang="en-US" sz="2800" dirty="0">
+                <a:latin typeface="+mn-lt"/>
+              </a:rPr>
+              <a:t>you logically split up the tasks for this large project? </a:t>
             </a:r>
           </a:p>
         </p:txBody>

</xml_diff>